<commit_message>
small update to presentation
</commit_message>
<xml_diff>
--- a/CS 579 Project Proposal.pptx
+++ b/CS 579 Project Proposal.pptx
@@ -251,7 +251,7 @@
           <a:p>
             <a:fld id="{C937BFE7-DDE3-4073-B37A-14CA23BB4801}" type="datetimeFigureOut">
               <a:rPr lang="en-US" smtClean="0"/>
-              <a:t>10/21/2014</a:t>
+              <a:t>10/22/2014</a:t>
             </a:fld>
             <a:endParaRPr lang="en-US"/>
           </a:p>
@@ -421,7 +421,7 @@
           <a:p>
             <a:fld id="{C937BFE7-DDE3-4073-B37A-14CA23BB4801}" type="datetimeFigureOut">
               <a:rPr lang="en-US" smtClean="0"/>
-              <a:t>10/21/2014</a:t>
+              <a:t>10/22/2014</a:t>
             </a:fld>
             <a:endParaRPr lang="en-US"/>
           </a:p>
@@ -601,7 +601,7 @@
           <a:p>
             <a:fld id="{C937BFE7-DDE3-4073-B37A-14CA23BB4801}" type="datetimeFigureOut">
               <a:rPr lang="en-US" smtClean="0"/>
-              <a:t>10/21/2014</a:t>
+              <a:t>10/22/2014</a:t>
             </a:fld>
             <a:endParaRPr lang="en-US"/>
           </a:p>
@@ -771,7 +771,7 @@
           <a:p>
             <a:fld id="{C937BFE7-DDE3-4073-B37A-14CA23BB4801}" type="datetimeFigureOut">
               <a:rPr lang="en-US" smtClean="0"/>
-              <a:t>10/21/2014</a:t>
+              <a:t>10/22/2014</a:t>
             </a:fld>
             <a:endParaRPr lang="en-US"/>
           </a:p>
@@ -1017,7 +1017,7 @@
           <a:p>
             <a:fld id="{C937BFE7-DDE3-4073-B37A-14CA23BB4801}" type="datetimeFigureOut">
               <a:rPr lang="en-US" smtClean="0"/>
-              <a:t>10/21/2014</a:t>
+              <a:t>10/22/2014</a:t>
             </a:fld>
             <a:endParaRPr lang="en-US"/>
           </a:p>
@@ -1249,7 +1249,7 @@
           <a:p>
             <a:fld id="{C937BFE7-DDE3-4073-B37A-14CA23BB4801}" type="datetimeFigureOut">
               <a:rPr lang="en-US" smtClean="0"/>
-              <a:t>10/21/2014</a:t>
+              <a:t>10/22/2014</a:t>
             </a:fld>
             <a:endParaRPr lang="en-US"/>
           </a:p>
@@ -1616,7 +1616,7 @@
           <a:p>
             <a:fld id="{C937BFE7-DDE3-4073-B37A-14CA23BB4801}" type="datetimeFigureOut">
               <a:rPr lang="en-US" smtClean="0"/>
-              <a:t>10/21/2014</a:t>
+              <a:t>10/22/2014</a:t>
             </a:fld>
             <a:endParaRPr lang="en-US"/>
           </a:p>
@@ -1734,7 +1734,7 @@
           <a:p>
             <a:fld id="{C937BFE7-DDE3-4073-B37A-14CA23BB4801}" type="datetimeFigureOut">
               <a:rPr lang="en-US" smtClean="0"/>
-              <a:t>10/21/2014</a:t>
+              <a:t>10/22/2014</a:t>
             </a:fld>
             <a:endParaRPr lang="en-US"/>
           </a:p>
@@ -1829,7 +1829,7 @@
           <a:p>
             <a:fld id="{C937BFE7-DDE3-4073-B37A-14CA23BB4801}" type="datetimeFigureOut">
               <a:rPr lang="en-US" smtClean="0"/>
-              <a:t>10/21/2014</a:t>
+              <a:t>10/22/2014</a:t>
             </a:fld>
             <a:endParaRPr lang="en-US"/>
           </a:p>
@@ -2106,7 +2106,7 @@
           <a:p>
             <a:fld id="{C937BFE7-DDE3-4073-B37A-14CA23BB4801}" type="datetimeFigureOut">
               <a:rPr lang="en-US" smtClean="0"/>
-              <a:t>10/21/2014</a:t>
+              <a:t>10/22/2014</a:t>
             </a:fld>
             <a:endParaRPr lang="en-US"/>
           </a:p>
@@ -2359,7 +2359,7 @@
           <a:p>
             <a:fld id="{C937BFE7-DDE3-4073-B37A-14CA23BB4801}" type="datetimeFigureOut">
               <a:rPr lang="en-US" smtClean="0"/>
-              <a:t>10/21/2014</a:t>
+              <a:t>10/22/2014</a:t>
             </a:fld>
             <a:endParaRPr lang="en-US"/>
           </a:p>
@@ -2572,7 +2572,7 @@
           <a:p>
             <a:fld id="{C937BFE7-DDE3-4073-B37A-14CA23BB4801}" type="datetimeFigureOut">
               <a:rPr lang="en-US" smtClean="0"/>
-              <a:t>10/21/2014</a:t>
+              <a:t>10/22/2014</a:t>
             </a:fld>
             <a:endParaRPr lang="en-US"/>
           </a:p>
@@ -2994,7 +2994,22 @@
           <a:p>
             <a:r>
               <a:rPr lang="en-US" dirty="0" smtClean="0"/>
-              <a:t>CS 579 Project Proposal</a:t>
+              <a:t>CS 579 Project </a:t>
+            </a:r>
+            <a:r>
+              <a:rPr lang="en-US" dirty="0" smtClean="0"/>
+              <a:t>Proposal</a:t>
+            </a:r>
+            <a:br>
+              <a:rPr lang="en-US" dirty="0" smtClean="0"/>
+            </a:br>
+            <a:r>
+              <a:rPr lang="en-US" dirty="0" smtClean="0"/>
+              <a:t>Twitter </a:t>
+            </a:r>
+            <a:r>
+              <a:rPr lang="en-US" smtClean="0"/>
+              <a:t>Movie Reviews</a:t>
             </a:r>
             <a:endParaRPr lang="en-US" dirty="0"/>
           </a:p>

</xml_diff>